<commit_message>
L03 Added Homework 3
</commit_message>
<xml_diff>
--- a/Lectures/Lesson 03 - OOP.pptx
+++ b/Lectures/Lesson 03 - OOP.pptx
@@ -21976,7 +21976,217 @@
           <a:bodyPr/>
           <a:lstStyle/>
           <a:p>
-            <a:endParaRPr lang="en-US" sz="2000" dirty="0"/>
+            <a:r>
+              <a:rPr lang="en-US" sz="1400" dirty="0"/>
+              <a:t>Extend previous homework implementation by next features:</a:t>
+            </a:r>
+          </a:p>
+          <a:p>
+            <a:pPr lvl="1"/>
+            <a:r>
+              <a:rPr lang="en-US" sz="1400" dirty="0"/>
+              <a:t>implement </a:t>
+            </a:r>
+            <a:r>
+              <a:rPr lang="en-US" sz="1400" dirty="0" err="1">
+                <a:hlinkClick r:id="rId2"/>
+              </a:rPr>
+              <a:t>Vigenère</a:t>
+            </a:r>
+            <a:r>
+              <a:rPr lang="en-US" sz="1400" dirty="0">
+                <a:hlinkClick r:id="rId2"/>
+              </a:rPr>
+              <a:t> cipher</a:t>
+            </a:r>
+            <a:r>
+              <a:rPr lang="en-US" sz="1400" dirty="0"/>
+              <a:t> encoder and decoder</a:t>
+            </a:r>
+          </a:p>
+          <a:p>
+            <a:pPr lvl="1"/>
+            <a:r>
+              <a:rPr lang="en-US" sz="1400" dirty="0"/>
+              <a:t>implement </a:t>
+            </a:r>
+            <a:r>
+              <a:rPr lang="en-US" sz="1400" b="1" i="1" dirty="0"/>
+              <a:t>Vigenère2x cipher </a:t>
+            </a:r>
+            <a:r>
+              <a:rPr lang="en-US" sz="1400" dirty="0"/>
+              <a:t>encoder and decoder (regular </a:t>
+            </a:r>
+            <a:r>
+              <a:rPr lang="en-US" sz="1400" b="1" i="1" dirty="0" err="1"/>
+              <a:t>Vigenère</a:t>
+            </a:r>
+            <a:r>
+              <a:rPr lang="en-US" sz="1400" b="1" i="1" dirty="0"/>
+              <a:t> cipher </a:t>
+            </a:r>
+            <a:r>
+              <a:rPr lang="en-US" sz="1400" dirty="0"/>
+              <a:t>that applies encoding/decoding twice)</a:t>
+            </a:r>
+          </a:p>
+          <a:p>
+            <a:pPr lvl="2"/>
+            <a:r>
+              <a:rPr lang="en-US" sz="1400" dirty="0"/>
+              <a:t>implement </a:t>
+            </a:r>
+            <a:r>
+              <a:rPr lang="en-US" sz="1400" b="1" i="1" dirty="0"/>
+              <a:t>Vigenère2x cipher </a:t>
+            </a:r>
+            <a:r>
+              <a:rPr lang="en-US" sz="1400" dirty="0"/>
+              <a:t>using </a:t>
+            </a:r>
+            <a:r>
+              <a:rPr lang="en-US" sz="1400" b="1" i="1" dirty="0"/>
+              <a:t>has-a </a:t>
+            </a:r>
+            <a:r>
+              <a:rPr lang="en-US" sz="1400" dirty="0"/>
+              <a:t>relationship</a:t>
+            </a:r>
+          </a:p>
+          <a:p>
+            <a:pPr lvl="2"/>
+            <a:r>
+              <a:rPr lang="en-US" sz="1400" dirty="0"/>
+              <a:t>implement </a:t>
+            </a:r>
+            <a:r>
+              <a:rPr lang="en-US" sz="1400" b="1" i="1" dirty="0"/>
+              <a:t>Vigenère2x cipher </a:t>
+            </a:r>
+            <a:r>
+              <a:rPr lang="en-US" sz="1400" dirty="0"/>
+              <a:t>using </a:t>
+            </a:r>
+            <a:r>
+              <a:rPr lang="en-US" sz="1400" b="1" i="1" dirty="0"/>
+              <a:t>is-a </a:t>
+            </a:r>
+            <a:r>
+              <a:rPr lang="en-US" sz="1400" dirty="0"/>
+              <a:t>relationship</a:t>
+            </a:r>
+            <a:endParaRPr lang="en-US" sz="1400" b="1" i="1" dirty="0"/>
+          </a:p>
+          <a:p>
+            <a:pPr lvl="1"/>
+            <a:r>
+              <a:rPr lang="en-US" sz="1400" dirty="0"/>
+              <a:t>implement </a:t>
+            </a:r>
+            <a:r>
+              <a:rPr lang="en-US" sz="1400" b="1" i="1" dirty="0" err="1"/>
+              <a:t>Vigenère</a:t>
+            </a:r>
+            <a:r>
+              <a:rPr lang="en-US" sz="1400" b="1" i="1" dirty="0"/>
+              <a:t> over Caesar </a:t>
+            </a:r>
+            <a:r>
+              <a:rPr lang="en-US" sz="1400" dirty="0"/>
+              <a:t>cipher encoder (should encode phrase via </a:t>
+            </a:r>
+            <a:r>
+              <a:rPr lang="en-US" sz="1400" b="1" i="1" dirty="0"/>
+              <a:t>Caesar </a:t>
+            </a:r>
+            <a:r>
+              <a:rPr lang="en-US" sz="1400" dirty="0"/>
+              <a:t>and the result of encoding should encode one more time via </a:t>
+            </a:r>
+            <a:r>
+              <a:rPr lang="en-US" sz="1400" b="1" i="1" dirty="0" err="1"/>
+              <a:t>Vigenère</a:t>
+            </a:r>
+            <a:r>
+              <a:rPr lang="en-US" sz="1400" dirty="0"/>
+              <a:t>)</a:t>
+            </a:r>
+          </a:p>
+          <a:p>
+            <a:pPr lvl="1"/>
+            <a:r>
+              <a:rPr lang="en-US" sz="1400" dirty="0"/>
+              <a:t>implement </a:t>
+            </a:r>
+            <a:r>
+              <a:rPr lang="en-US" sz="1400" b="1" i="1" dirty="0" err="1"/>
+              <a:t>Vigenère</a:t>
+            </a:r>
+            <a:r>
+              <a:rPr lang="en-US" sz="1400" b="1" i="1" dirty="0"/>
+              <a:t> over Caesar </a:t>
+            </a:r>
+            <a:r>
+              <a:rPr lang="en-US" sz="1400" dirty="0"/>
+              <a:t>cipher decoder (should decode phrase via </a:t>
+            </a:r>
+            <a:r>
+              <a:rPr lang="en-US" sz="1400" b="1" i="1" dirty="0" err="1"/>
+              <a:t>Vigenère</a:t>
+            </a:r>
+            <a:r>
+              <a:rPr lang="en-US" sz="1400" b="1" i="1" dirty="0"/>
+              <a:t> </a:t>
+            </a:r>
+            <a:r>
+              <a:rPr lang="en-US" sz="1400" dirty="0"/>
+              <a:t>and the result of encoding should encode one more time via </a:t>
+            </a:r>
+            <a:r>
+              <a:rPr lang="en-US" sz="1400" b="1" i="1" dirty="0"/>
+              <a:t>Caesar</a:t>
+            </a:r>
+            <a:r>
+              <a:rPr lang="en-US" sz="1400" dirty="0"/>
+              <a:t>)</a:t>
+            </a:r>
+          </a:p>
+          <a:p>
+            <a:r>
+              <a:rPr lang="en-US" sz="1400" dirty="0"/>
+              <a:t>All new ciphers should be:</a:t>
+            </a:r>
+          </a:p>
+          <a:p>
+            <a:pPr lvl="1"/>
+            <a:r>
+              <a:rPr lang="en-US" sz="1400" dirty="0"/>
+              <a:t>added into </a:t>
+            </a:r>
+            <a:r>
+              <a:rPr lang="en-US" sz="1400" b="1" i="1" dirty="0"/>
+              <a:t>Algorithms </a:t>
+            </a:r>
+            <a:r>
+              <a:rPr lang="en-US" sz="1400" dirty="0" err="1"/>
+              <a:t>enum</a:t>
+            </a:r>
+            <a:endParaRPr lang="en-US" sz="1400" dirty="0"/>
+          </a:p>
+          <a:p>
+            <a:pPr lvl="1"/>
+            <a:r>
+              <a:rPr lang="en-US" sz="1400" dirty="0"/>
+              <a:t>created via factories</a:t>
+            </a:r>
+          </a:p>
+          <a:p>
+            <a:pPr lvl="1"/>
+            <a:r>
+              <a:rPr lang="en-US" sz="1400" dirty="0"/>
+              <a:t>displayed in menu and history (implemented in Homework 2)</a:t>
+            </a:r>
           </a:p>
         </p:txBody>
       </p:sp>
@@ -22120,6 +22330,21 @@
                 <a:hlinkClick r:id="rId4"/>
               </a:rPr>
               <a:t>Object-Oriented Programming Concepts</a:t>
+            </a:r>
+            <a:endParaRPr lang="en-US" dirty="0"/>
+          </a:p>
+          <a:p>
+            <a:r>
+              <a:rPr lang="en-US" dirty="0" err="1">
+                <a:hlinkClick r:id="rId5"/>
+              </a:rPr>
+              <a:t>Vigenère</a:t>
+            </a:r>
+            <a:r>
+              <a:rPr lang="en-US">
+                <a:hlinkClick r:id="rId5"/>
+              </a:rPr>
+              <a:t> cipher</a:t>
             </a:r>
             <a:endParaRPr lang="en-US" dirty="0"/>
           </a:p>

</xml_diff>